<commit_message>
RTC clock project updated
</commit_message>
<xml_diff>
--- a/AVR/Mini Project - Clock with room temperature & Pressure/watch_temp_pressure/RTC_Watch_Project_BMP280.pptx
+++ b/AVR/Mini Project - Clock with room temperature & Pressure/watch_temp_pressure/RTC_Watch_Project_BMP280.pptx
@@ -15,8 +15,7 @@
     <p:sldId id="263" r:id="rId9"/>
     <p:sldId id="264" r:id="rId10"/>
     <p:sldId id="265" r:id="rId11"/>
-    <p:sldId id="267" r:id="rId12"/>
-    <p:sldId id="266" r:id="rId13"/>
+    <p:sldId id="266" r:id="rId12"/>
   </p:sldIdLst>
   <p:sldSz cx="9144000" cy="6858000" type="screen4x3"/>
   <p:notesSz cx="6858000" cy="9144000"/>
@@ -320,7 +319,7 @@
           <a:p>
             <a:fld id="{5BCAD085-E8A6-8845-BD4E-CB4CCA059FC4}" type="datetimeFigureOut">
               <a:rPr lang="en-US" smtClean="0"/>
-              <a:t>1/26/2026</a:t>
+              <a:t>1/29/2026</a:t>
             </a:fld>
             <a:endParaRPr lang="en-US"/>
           </a:p>
@@ -595,7 +594,7 @@
           <a:p>
             <a:fld id="{5BCAD085-E8A6-8845-BD4E-CB4CCA059FC4}" type="datetimeFigureOut">
               <a:rPr lang="en-US" smtClean="0"/>
-              <a:t>1/26/2026</a:t>
+              <a:t>1/29/2026</a:t>
             </a:fld>
             <a:endParaRPr lang="en-US"/>
           </a:p>
@@ -789,7 +788,7 @@
           <a:p>
             <a:fld id="{5BCAD085-E8A6-8845-BD4E-CB4CCA059FC4}" type="datetimeFigureOut">
               <a:rPr lang="en-US" smtClean="0"/>
-              <a:t>1/26/2026</a:t>
+              <a:t>1/29/2026</a:t>
             </a:fld>
             <a:endParaRPr lang="en-US"/>
           </a:p>
@@ -1060,7 +1059,7 @@
           <a:p>
             <a:fld id="{5BCAD085-E8A6-8845-BD4E-CB4CCA059FC4}" type="datetimeFigureOut">
               <a:rPr lang="en-US" smtClean="0"/>
-              <a:t>1/26/2026</a:t>
+              <a:t>1/29/2026</a:t>
             </a:fld>
             <a:endParaRPr lang="en-US"/>
           </a:p>
@@ -1387,7 +1386,7 @@
           <a:p>
             <a:fld id="{5BCAD085-E8A6-8845-BD4E-CB4CCA059FC4}" type="datetimeFigureOut">
               <a:rPr lang="en-US" smtClean="0"/>
-              <a:t>1/26/2026</a:t>
+              <a:t>1/29/2026</a:t>
             </a:fld>
             <a:endParaRPr lang="en-US"/>
           </a:p>
@@ -2006,7 +2005,7 @@
           <a:p>
             <a:fld id="{5BCAD085-E8A6-8845-BD4E-CB4CCA059FC4}" type="datetimeFigureOut">
               <a:rPr lang="en-US" smtClean="0"/>
-              <a:t>1/26/2026</a:t>
+              <a:t>1/29/2026</a:t>
             </a:fld>
             <a:endParaRPr lang="en-US"/>
           </a:p>
@@ -2862,7 +2861,7 @@
           <a:p>
             <a:fld id="{5BCAD085-E8A6-8845-BD4E-CB4CCA059FC4}" type="datetimeFigureOut">
               <a:rPr lang="en-US" smtClean="0"/>
-              <a:t>1/26/2026</a:t>
+              <a:t>1/29/2026</a:t>
             </a:fld>
             <a:endParaRPr lang="en-US"/>
           </a:p>
@@ -3032,7 +3031,7 @@
           <a:p>
             <a:fld id="{5BCAD085-E8A6-8845-BD4E-CB4CCA059FC4}" type="datetimeFigureOut">
               <a:rPr lang="en-US" smtClean="0"/>
-              <a:t>1/26/2026</a:t>
+              <a:t>1/29/2026</a:t>
             </a:fld>
             <a:endParaRPr lang="en-US"/>
           </a:p>
@@ -3212,7 +3211,7 @@
           <a:p>
             <a:fld id="{5BCAD085-E8A6-8845-BD4E-CB4CCA059FC4}" type="datetimeFigureOut">
               <a:rPr lang="en-US" smtClean="0"/>
-              <a:t>1/26/2026</a:t>
+              <a:t>1/29/2026</a:t>
             </a:fld>
             <a:endParaRPr lang="en-US"/>
           </a:p>
@@ -3382,7 +3381,7 @@
           <a:p>
             <a:fld id="{5BCAD085-E8A6-8845-BD4E-CB4CCA059FC4}" type="datetimeFigureOut">
               <a:rPr lang="en-US" smtClean="0"/>
-              <a:t>1/26/2026</a:t>
+              <a:t>1/29/2026</a:t>
             </a:fld>
             <a:endParaRPr lang="en-US"/>
           </a:p>
@@ -3629,7 +3628,7 @@
           <a:p>
             <a:fld id="{5BCAD085-E8A6-8845-BD4E-CB4CCA059FC4}" type="datetimeFigureOut">
               <a:rPr lang="en-US" smtClean="0"/>
-              <a:t>1/26/2026</a:t>
+              <a:t>1/29/2026</a:t>
             </a:fld>
             <a:endParaRPr lang="en-US"/>
           </a:p>
@@ -3921,7 +3920,7 @@
           <a:p>
             <a:fld id="{5BCAD085-E8A6-8845-BD4E-CB4CCA059FC4}" type="datetimeFigureOut">
               <a:rPr lang="en-US" smtClean="0"/>
-              <a:t>1/26/2026</a:t>
+              <a:t>1/29/2026</a:t>
             </a:fld>
             <a:endParaRPr lang="en-US"/>
           </a:p>
@@ -4365,7 +4364,7 @@
           <a:p>
             <a:fld id="{5BCAD085-E8A6-8845-BD4E-CB4CCA059FC4}" type="datetimeFigureOut">
               <a:rPr lang="en-US" smtClean="0"/>
-              <a:t>1/26/2026</a:t>
+              <a:t>1/29/2026</a:t>
             </a:fld>
             <a:endParaRPr lang="en-US"/>
           </a:p>
@@ -4483,7 +4482,7 @@
           <a:p>
             <a:fld id="{5BCAD085-E8A6-8845-BD4E-CB4CCA059FC4}" type="datetimeFigureOut">
               <a:rPr lang="en-US" smtClean="0"/>
-              <a:t>1/26/2026</a:t>
+              <a:t>1/29/2026</a:t>
             </a:fld>
             <a:endParaRPr lang="en-US"/>
           </a:p>
@@ -4578,7 +4577,7 @@
           <a:p>
             <a:fld id="{5BCAD085-E8A6-8845-BD4E-CB4CCA059FC4}" type="datetimeFigureOut">
               <a:rPr lang="en-US" smtClean="0"/>
-              <a:t>1/26/2026</a:t>
+              <a:t>1/29/2026</a:t>
             </a:fld>
             <a:endParaRPr lang="en-US"/>
           </a:p>
@@ -4857,7 +4856,7 @@
           <a:p>
             <a:fld id="{5BCAD085-E8A6-8845-BD4E-CB4CCA059FC4}" type="datetimeFigureOut">
               <a:rPr lang="en-US" smtClean="0"/>
-              <a:t>1/26/2026</a:t>
+              <a:t>1/29/2026</a:t>
             </a:fld>
             <a:endParaRPr lang="en-US"/>
           </a:p>
@@ -5132,7 +5131,7 @@
           <a:p>
             <a:fld id="{5BCAD085-E8A6-8845-BD4E-CB4CCA059FC4}" type="datetimeFigureOut">
               <a:rPr lang="en-US" smtClean="0"/>
-              <a:t>1/26/2026</a:t>
+              <a:t>1/29/2026</a:t>
             </a:fld>
             <a:endParaRPr lang="en-US"/>
           </a:p>
@@ -5667,7 +5666,7 @@
           <a:p>
             <a:fld id="{5BCAD085-E8A6-8845-BD4E-CB4CCA059FC4}" type="datetimeFigureOut">
               <a:rPr lang="en-US" smtClean="0"/>
-              <a:t>1/26/2026</a:t>
+              <a:t>1/29/2026</a:t>
             </a:fld>
             <a:endParaRPr lang="en-US"/>
           </a:p>
@@ -6217,13 +6216,34 @@
           <a:p>
             <a:r>
               <a:rPr dirty="0"/>
-              <a:t>RTC-Based Digital Watch</a:t>
-            </a:r>
+              <a:t>RTC-Based Digital </a:t>
+            </a:r>
+            <a:r>
+              <a:rPr lang="en-IN" dirty="0"/>
+              <a:t>Clock</a:t>
+            </a:r>
+            <a:endParaRPr dirty="0"/>
           </a:p>
           <a:p>
             <a:r>
               <a:rPr dirty="0"/>
-              <a:t>(Time, Date &amp; Temperature)</a:t>
+              <a:t>(Time, Date</a:t>
+            </a:r>
+            <a:r>
+              <a:rPr lang="en-IN" dirty="0"/>
+              <a:t>, </a:t>
+            </a:r>
+            <a:r>
+              <a:rPr dirty="0"/>
+              <a:t>Temperature</a:t>
+            </a:r>
+            <a:r>
+              <a:rPr lang="en-IN" dirty="0"/>
+              <a:t> &amp; pressure</a:t>
+            </a:r>
+            <a:r>
+              <a:rPr dirty="0"/>
+              <a:t>)</a:t>
             </a:r>
           </a:p>
         </p:txBody>
@@ -6238,7 +6258,12 @@
             <p:ph idx="1"/>
           </p:nvPr>
         </p:nvSpPr>
-        <p:spPr/>
+        <p:spPr>
+          <a:xfrm>
+            <a:off x="718842" y="2880240"/>
+            <a:ext cx="6711654" cy="2388446"/>
+          </a:xfrm>
+        </p:spPr>
         <p:txBody>
           <a:bodyPr/>
           <a:lstStyle/>
@@ -6413,97 +6438,6 @@
           <a:lstStyle/>
           <a:p>
             <a:r>
-              <a:t>Temperature Sensing – BMP280</a:t>
-            </a:r>
-          </a:p>
-        </p:txBody>
-      </p:sp>
-      <p:sp>
-        <p:nvSpPr>
-          <p:cNvPr id="3" name="Content Placeholder 2"/>
-          <p:cNvSpPr>
-            <a:spLocks noGrp="1"/>
-          </p:cNvSpPr>
-          <p:nvPr>
-            <p:ph idx="1"/>
-          </p:nvPr>
-        </p:nvSpPr>
-        <p:spPr/>
-        <p:txBody>
-          <a:bodyPr/>
-          <a:lstStyle/>
-          <a:p>
-            <a:r>
-              <a:rPr dirty="0"/>
-              <a:t>• BMP280 Digital Temperature Sensor</a:t>
-            </a:r>
-            <a:r>
-              <a:rPr lang="en-IN" dirty="0"/>
-              <a:t> interfaced via SPI protocol</a:t>
-            </a:r>
-            <a:endParaRPr dirty="0"/>
-          </a:p>
-          <a:p>
-            <a:r>
-              <a:rPr dirty="0"/>
-              <a:t>• High accuracy temperature measurement</a:t>
-            </a:r>
-          </a:p>
-          <a:p>
-            <a:r>
-              <a:rPr dirty="0"/>
-              <a:t>• Factory calibrated sensor</a:t>
-            </a:r>
-          </a:p>
-          <a:p>
-            <a:r>
-              <a:rPr dirty="0"/>
-              <a:t>• Used for room temperature display</a:t>
-            </a:r>
-          </a:p>
-        </p:txBody>
-      </p:sp>
-    </p:spTree>
-  </p:cSld>
-  <p:clrMapOvr>
-    <a:masterClrMapping/>
-  </p:clrMapOvr>
-</p:sld>
-</file>
-
-<file path=ppt/slides/slide12.xml><?xml version="1.0" encoding="utf-8"?>
-<p:sld xmlns:a="http://schemas.openxmlformats.org/drawingml/2006/main" xmlns:r="http://schemas.openxmlformats.org/officeDocument/2006/relationships" xmlns:p="http://schemas.openxmlformats.org/presentationml/2006/main">
-  <p:cSld>
-    <p:spTree>
-      <p:nvGrpSpPr>
-        <p:cNvPr id="1" name=""/>
-        <p:cNvGrpSpPr/>
-        <p:nvPr/>
-      </p:nvGrpSpPr>
-      <p:grpSpPr>
-        <a:xfrm>
-          <a:off x="0" y="0"/>
-          <a:ext cx="0" cy="0"/>
-          <a:chOff x="0" y="0"/>
-          <a:chExt cx="0" cy="0"/>
-        </a:xfrm>
-      </p:grpSpPr>
-      <p:sp>
-        <p:nvSpPr>
-          <p:cNvPr id="2" name="Title 1"/>
-          <p:cNvSpPr>
-            <a:spLocks noGrp="1"/>
-          </p:cNvSpPr>
-          <p:nvPr>
-            <p:ph type="title"/>
-          </p:nvPr>
-        </p:nvSpPr>
-        <p:spPr/>
-        <p:txBody>
-          <a:bodyPr/>
-          <a:lstStyle/>
-          <a:p>
-            <a:r>
               <a:t>Conclusion</a:t>
             </a:r>
           </a:p>
@@ -6610,21 +6544,30 @@
           <a:lstStyle/>
           <a:p>
             <a:r>
-              <a:t>• Digital watch displaying Time, Date, and Room Temperature</a:t>
-            </a:r>
-          </a:p>
-          <a:p>
-            <a:r>
+              <a:rPr dirty="0"/>
+              <a:t>• Digital watch displaying Time, Date, Room Temperature</a:t>
+            </a:r>
+            <a:r>
+              <a:rPr lang="en-IN" dirty="0"/>
+              <a:t> &amp; pressure</a:t>
+            </a:r>
+            <a:endParaRPr dirty="0"/>
+          </a:p>
+          <a:p>
+            <a:r>
+              <a:rPr dirty="0"/>
               <a:t>• Real-time data using RTC</a:t>
             </a:r>
           </a:p>
           <a:p>
             <a:r>
+              <a:rPr dirty="0"/>
               <a:t>• OLED-based graphical display</a:t>
             </a:r>
           </a:p>
           <a:p>
             <a:r>
+              <a:rPr dirty="0"/>
               <a:t>• Designed using embedded C (bare-metal)</a:t>
             </a:r>
           </a:p>
@@ -6692,31 +6635,50 @@
           <a:lstStyle/>
           <a:p>
             <a:r>
-              <a:t>• AVR Microcontroller (ATmega series)</a:t>
-            </a:r>
-          </a:p>
-          <a:p>
-            <a:r>
+              <a:rPr dirty="0"/>
+              <a:t>• AVR Microcontroller (</a:t>
+            </a:r>
+            <a:r>
+              <a:rPr dirty="0" err="1"/>
+              <a:t>ATmega</a:t>
+            </a:r>
+            <a:r>
+              <a:rPr dirty="0"/>
+              <a:t> series)</a:t>
+            </a:r>
+          </a:p>
+          <a:p>
+            <a:r>
+              <a:rPr dirty="0"/>
               <a:t>• DS1307 RTC Module</a:t>
             </a:r>
           </a:p>
           <a:p>
             <a:r>
+              <a:rPr dirty="0"/>
               <a:t>• OLED Display (SSD1306 – I2C)</a:t>
             </a:r>
           </a:p>
           <a:p>
             <a:r>
-              <a:t>• Temperature Sensor</a:t>
-            </a:r>
-          </a:p>
-          <a:p>
-            <a:r>
+              <a:rPr dirty="0"/>
+              <a:t>• </a:t>
+            </a:r>
+            <a:r>
+              <a:rPr lang="en-IN" dirty="0"/>
+              <a:t>BMP 280 for temperature &amp; pressure sensing</a:t>
+            </a:r>
+            <a:endParaRPr dirty="0"/>
+          </a:p>
+          <a:p>
+            <a:r>
+              <a:rPr dirty="0"/>
               <a:t>• Backup Battery (RTC)</a:t>
             </a:r>
           </a:p>
           <a:p>
             <a:r>
+              <a:rPr dirty="0"/>
               <a:t>• Power Supply</a:t>
             </a:r>
           </a:p>
@@ -7028,7 +6990,16 @@
           <a:lstStyle/>
           <a:p>
             <a:r>
-              <a:t>Temperature Display</a:t>
+              <a:rPr dirty="0"/>
+              <a:t>Temperature </a:t>
+            </a:r>
+            <a:r>
+              <a:rPr lang="en-IN" dirty="0"/>
+              <a:t>&amp; Pressure </a:t>
+            </a:r>
+            <a:r>
+              <a:rPr dirty="0"/>
+              <a:t>Display</a:t>
             </a:r>
           </a:p>
         </p:txBody>
@@ -7049,26 +7020,47 @@
           <a:lstStyle/>
           <a:p>
             <a:r>
-              <a:t>• Temperature measured using BMP280 sensor</a:t>
-            </a:r>
-          </a:p>
-          <a:p>
-            <a:r>
+              <a:rPr dirty="0"/>
+              <a:t>• Temperature</a:t>
+            </a:r>
+            <a:r>
+              <a:rPr lang="en-IN" dirty="0"/>
+              <a:t> &amp; Pressure</a:t>
+            </a:r>
+            <a:r>
+              <a:rPr dirty="0"/>
+              <a:t> measured using BMP280 sensor</a:t>
+            </a:r>
+          </a:p>
+          <a:p>
+            <a:r>
+              <a:rPr dirty="0"/>
               <a:t>• Digital sensor with factory calibration</a:t>
             </a:r>
           </a:p>
           <a:p>
             <a:r>
+              <a:rPr dirty="0"/>
               <a:t>• Value displayed with two decimal places</a:t>
             </a:r>
           </a:p>
           <a:p>
             <a:r>
-              <a:t>• Custom float formatting (no printf)</a:t>
-            </a:r>
-          </a:p>
-          <a:p>
-            <a:r>
+              <a:rPr dirty="0"/>
+              <a:t>• Custom float formatting (no </a:t>
+            </a:r>
+            <a:r>
+              <a:rPr dirty="0" err="1"/>
+              <a:t>printf</a:t>
+            </a:r>
+            <a:r>
+              <a:rPr dirty="0"/>
+              <a:t>)</a:t>
+            </a:r>
+          </a:p>
+          <a:p>
+            <a:r>
+              <a:rPr dirty="0"/>
               <a:t>• Optimized for embedded systems</a:t>
             </a:r>
           </a:p>

</xml_diff>